<commit_message>
#11 updated menu Mock up
</commit_message>
<xml_diff>
--- a/docs/ER-DIAGRAM.pptx
+++ b/docs/ER-DIAGRAM.pptx
@@ -244,7 +244,7 @@
           <a:p>
             <a:fld id="{28BE630F-C39C-4DB9-8258-0B48CA067079}" type="datetimeFigureOut">
               <a:rPr lang="en-US" smtClean="0"/>
-              <a:t>11/25/2021</a:t>
+              <a:t>11/27/2021</a:t>
             </a:fld>
             <a:endParaRPr lang="en-US"/>
           </a:p>
@@ -414,7 +414,7 @@
           <a:p>
             <a:fld id="{28BE630F-C39C-4DB9-8258-0B48CA067079}" type="datetimeFigureOut">
               <a:rPr lang="en-US" smtClean="0"/>
-              <a:t>11/25/2021</a:t>
+              <a:t>11/27/2021</a:t>
             </a:fld>
             <a:endParaRPr lang="en-US"/>
           </a:p>
@@ -594,7 +594,7 @@
           <a:p>
             <a:fld id="{28BE630F-C39C-4DB9-8258-0B48CA067079}" type="datetimeFigureOut">
               <a:rPr lang="en-US" smtClean="0"/>
-              <a:t>11/25/2021</a:t>
+              <a:t>11/27/2021</a:t>
             </a:fld>
             <a:endParaRPr lang="en-US"/>
           </a:p>
@@ -764,7 +764,7 @@
           <a:p>
             <a:fld id="{28BE630F-C39C-4DB9-8258-0B48CA067079}" type="datetimeFigureOut">
               <a:rPr lang="en-US" smtClean="0"/>
-              <a:t>11/25/2021</a:t>
+              <a:t>11/27/2021</a:t>
             </a:fld>
             <a:endParaRPr lang="en-US"/>
           </a:p>
@@ -1010,7 +1010,7 @@
           <a:p>
             <a:fld id="{28BE630F-C39C-4DB9-8258-0B48CA067079}" type="datetimeFigureOut">
               <a:rPr lang="en-US" smtClean="0"/>
-              <a:t>11/25/2021</a:t>
+              <a:t>11/27/2021</a:t>
             </a:fld>
             <a:endParaRPr lang="en-US"/>
           </a:p>
@@ -1242,7 +1242,7 @@
           <a:p>
             <a:fld id="{28BE630F-C39C-4DB9-8258-0B48CA067079}" type="datetimeFigureOut">
               <a:rPr lang="en-US" smtClean="0"/>
-              <a:t>11/25/2021</a:t>
+              <a:t>11/27/2021</a:t>
             </a:fld>
             <a:endParaRPr lang="en-US"/>
           </a:p>
@@ -1609,7 +1609,7 @@
           <a:p>
             <a:fld id="{28BE630F-C39C-4DB9-8258-0B48CA067079}" type="datetimeFigureOut">
               <a:rPr lang="en-US" smtClean="0"/>
-              <a:t>11/25/2021</a:t>
+              <a:t>11/27/2021</a:t>
             </a:fld>
             <a:endParaRPr lang="en-US"/>
           </a:p>
@@ -1727,7 +1727,7 @@
           <a:p>
             <a:fld id="{28BE630F-C39C-4DB9-8258-0B48CA067079}" type="datetimeFigureOut">
               <a:rPr lang="en-US" smtClean="0"/>
-              <a:t>11/25/2021</a:t>
+              <a:t>11/27/2021</a:t>
             </a:fld>
             <a:endParaRPr lang="en-US"/>
           </a:p>
@@ -1822,7 +1822,7 @@
           <a:p>
             <a:fld id="{28BE630F-C39C-4DB9-8258-0B48CA067079}" type="datetimeFigureOut">
               <a:rPr lang="en-US" smtClean="0"/>
-              <a:t>11/25/2021</a:t>
+              <a:t>11/27/2021</a:t>
             </a:fld>
             <a:endParaRPr lang="en-US"/>
           </a:p>
@@ -2099,7 +2099,7 @@
           <a:p>
             <a:fld id="{28BE630F-C39C-4DB9-8258-0B48CA067079}" type="datetimeFigureOut">
               <a:rPr lang="en-US" smtClean="0"/>
-              <a:t>11/25/2021</a:t>
+              <a:t>11/27/2021</a:t>
             </a:fld>
             <a:endParaRPr lang="en-US"/>
           </a:p>
@@ -2352,7 +2352,7 @@
           <a:p>
             <a:fld id="{28BE630F-C39C-4DB9-8258-0B48CA067079}" type="datetimeFigureOut">
               <a:rPr lang="en-US" smtClean="0"/>
-              <a:t>11/25/2021</a:t>
+              <a:t>11/27/2021</a:t>
             </a:fld>
             <a:endParaRPr lang="en-US"/>
           </a:p>
@@ -2565,7 +2565,7 @@
           <a:p>
             <a:fld id="{28BE630F-C39C-4DB9-8258-0B48CA067079}" type="datetimeFigureOut">
               <a:rPr lang="en-US" smtClean="0"/>
-              <a:t>11/25/2021</a:t>
+              <a:t>11/27/2021</a:t>
             </a:fld>
             <a:endParaRPr lang="en-US"/>
           </a:p>

</xml_diff>

<commit_message>
#40 fixed and updated category
</commit_message>
<xml_diff>
--- a/docs/ER-DIAGRAM.pptx
+++ b/docs/ER-DIAGRAM.pptx
@@ -242,7 +242,7 @@
           <a:p>
             <a:fld id="{28BE630F-C39C-4DB9-8258-0B48CA067079}" type="datetimeFigureOut">
               <a:rPr lang="en-US" smtClean="0"/>
-              <a:t>11/30/2021</a:t>
+              <a:t>12/3/2021</a:t>
             </a:fld>
             <a:endParaRPr lang="en-US"/>
           </a:p>
@@ -410,7 +410,7 @@
           <a:p>
             <a:fld id="{28BE630F-C39C-4DB9-8258-0B48CA067079}" type="datetimeFigureOut">
               <a:rPr lang="en-US" smtClean="0"/>
-              <a:t>11/30/2021</a:t>
+              <a:t>12/3/2021</a:t>
             </a:fld>
             <a:endParaRPr lang="en-US"/>
           </a:p>
@@ -588,7 +588,7 @@
           <a:p>
             <a:fld id="{28BE630F-C39C-4DB9-8258-0B48CA067079}" type="datetimeFigureOut">
               <a:rPr lang="en-US" smtClean="0"/>
-              <a:t>11/30/2021</a:t>
+              <a:t>12/3/2021</a:t>
             </a:fld>
             <a:endParaRPr lang="en-US"/>
           </a:p>
@@ -756,7 +756,7 @@
           <a:p>
             <a:fld id="{28BE630F-C39C-4DB9-8258-0B48CA067079}" type="datetimeFigureOut">
               <a:rPr lang="en-US" smtClean="0"/>
-              <a:t>11/30/2021</a:t>
+              <a:t>12/3/2021</a:t>
             </a:fld>
             <a:endParaRPr lang="en-US"/>
           </a:p>
@@ -1001,7 +1001,7 @@
           <a:p>
             <a:fld id="{28BE630F-C39C-4DB9-8258-0B48CA067079}" type="datetimeFigureOut">
               <a:rPr lang="en-US" smtClean="0"/>
-              <a:t>11/30/2021</a:t>
+              <a:t>12/3/2021</a:t>
             </a:fld>
             <a:endParaRPr lang="en-US"/>
           </a:p>
@@ -1230,7 +1230,7 @@
           <a:p>
             <a:fld id="{28BE630F-C39C-4DB9-8258-0B48CA067079}" type="datetimeFigureOut">
               <a:rPr lang="en-US" smtClean="0"/>
-              <a:t>11/30/2021</a:t>
+              <a:t>12/3/2021</a:t>
             </a:fld>
             <a:endParaRPr lang="en-US"/>
           </a:p>
@@ -1594,7 +1594,7 @@
           <a:p>
             <a:fld id="{28BE630F-C39C-4DB9-8258-0B48CA067079}" type="datetimeFigureOut">
               <a:rPr lang="en-US" smtClean="0"/>
-              <a:t>11/30/2021</a:t>
+              <a:t>12/3/2021</a:t>
             </a:fld>
             <a:endParaRPr lang="en-US"/>
           </a:p>
@@ -1711,7 +1711,7 @@
           <a:p>
             <a:fld id="{28BE630F-C39C-4DB9-8258-0B48CA067079}" type="datetimeFigureOut">
               <a:rPr lang="en-US" smtClean="0"/>
-              <a:t>11/30/2021</a:t>
+              <a:t>12/3/2021</a:t>
             </a:fld>
             <a:endParaRPr lang="en-US"/>
           </a:p>
@@ -1806,7 +1806,7 @@
           <a:p>
             <a:fld id="{28BE630F-C39C-4DB9-8258-0B48CA067079}" type="datetimeFigureOut">
               <a:rPr lang="en-US" smtClean="0"/>
-              <a:t>11/30/2021</a:t>
+              <a:t>12/3/2021</a:t>
             </a:fld>
             <a:endParaRPr lang="en-US"/>
           </a:p>
@@ -2081,7 +2081,7 @@
           <a:p>
             <a:fld id="{28BE630F-C39C-4DB9-8258-0B48CA067079}" type="datetimeFigureOut">
               <a:rPr lang="en-US" smtClean="0"/>
-              <a:t>11/30/2021</a:t>
+              <a:t>12/3/2021</a:t>
             </a:fld>
             <a:endParaRPr lang="en-US"/>
           </a:p>
@@ -2333,7 +2333,7 @@
           <a:p>
             <a:fld id="{28BE630F-C39C-4DB9-8258-0B48CA067079}" type="datetimeFigureOut">
               <a:rPr lang="en-US" smtClean="0"/>
-              <a:t>11/30/2021</a:t>
+              <a:t>12/3/2021</a:t>
             </a:fld>
             <a:endParaRPr lang="en-US"/>
           </a:p>
@@ -2544,7 +2544,7 @@
           <a:p>
             <a:fld id="{28BE630F-C39C-4DB9-8258-0B48CA067079}" type="datetimeFigureOut">
               <a:rPr lang="en-US" smtClean="0"/>
-              <a:t>11/30/2021</a:t>
+              <a:t>12/3/2021</a:t>
             </a:fld>
             <a:endParaRPr lang="en-US"/>
           </a:p>
@@ -4534,6 +4534,310 @@
           </a:p>
         </p:txBody>
       </p:sp>
+      <p:cxnSp>
+        <p:nvCxnSpPr>
+          <p:cNvPr id="3" name="Straight Connector 2">
+            <a:extLst>
+              <a:ext uri="{FF2B5EF4-FFF2-40B4-BE49-F238E27FC236}">
+                <a16:creationId xmlns:a16="http://schemas.microsoft.com/office/drawing/2014/main" id="{8169E5E1-A808-4FD4-9B9A-6C48CD4BE550}"/>
+              </a:ext>
+            </a:extLst>
+          </p:cNvPr>
+          <p:cNvCxnSpPr>
+            <a:cxnSpLocks/>
+          </p:cNvCxnSpPr>
+          <p:nvPr/>
+        </p:nvCxnSpPr>
+        <p:spPr>
+          <a:xfrm>
+            <a:off x="2150075" y="2443067"/>
+            <a:ext cx="0" cy="2120719"/>
+          </a:xfrm>
+          <a:prstGeom prst="line">
+            <a:avLst/>
+          </a:prstGeom>
+        </p:spPr>
+        <p:style>
+          <a:lnRef idx="1">
+            <a:schemeClr val="accent1"/>
+          </a:lnRef>
+          <a:fillRef idx="0">
+            <a:schemeClr val="accent1"/>
+          </a:fillRef>
+          <a:effectRef idx="0">
+            <a:schemeClr val="accent1"/>
+          </a:effectRef>
+          <a:fontRef idx="minor">
+            <a:schemeClr val="tx1"/>
+          </a:fontRef>
+        </p:style>
+      </p:cxnSp>
+      <p:sp>
+        <p:nvSpPr>
+          <p:cNvPr id="21" name="TextBox 20">
+            <a:extLst>
+              <a:ext uri="{FF2B5EF4-FFF2-40B4-BE49-F238E27FC236}">
+                <a16:creationId xmlns:a16="http://schemas.microsoft.com/office/drawing/2014/main" id="{E9A0A6A4-46EB-4CE7-B97F-A9507744A285}"/>
+              </a:ext>
+            </a:extLst>
+          </p:cNvPr>
+          <p:cNvSpPr txBox="1"/>
+          <p:nvPr/>
+        </p:nvSpPr>
+        <p:spPr>
+          <a:xfrm>
+            <a:off x="2128463" y="2392929"/>
+            <a:ext cx="301686" cy="369332"/>
+          </a:xfrm>
+          <a:prstGeom prst="rect">
+            <a:avLst/>
+          </a:prstGeom>
+          <a:noFill/>
+        </p:spPr>
+        <p:txBody>
+          <a:bodyPr wrap="none" rtlCol="0">
+            <a:spAutoFit/>
+          </a:bodyPr>
+          <a:lstStyle>
+            <a:defPPr>
+              <a:defRPr lang="en-US"/>
+            </a:defPPr>
+            <a:lvl1pPr marL="0" algn="l" defTabSz="914400" rtl="0" eaLnBrk="1" latinLnBrk="0" hangingPunct="1">
+              <a:defRPr sz="1800" kern="1200">
+                <a:solidFill>
+                  <a:schemeClr val="tx1"/>
+                </a:solidFill>
+                <a:latin typeface="+mn-lt"/>
+                <a:ea typeface="+mn-ea"/>
+                <a:cs typeface="+mn-cs"/>
+              </a:defRPr>
+            </a:lvl1pPr>
+            <a:lvl2pPr marL="457200" algn="l" defTabSz="914400" rtl="0" eaLnBrk="1" latinLnBrk="0" hangingPunct="1">
+              <a:defRPr sz="1800" kern="1200">
+                <a:solidFill>
+                  <a:schemeClr val="tx1"/>
+                </a:solidFill>
+                <a:latin typeface="+mn-lt"/>
+                <a:ea typeface="+mn-ea"/>
+                <a:cs typeface="+mn-cs"/>
+              </a:defRPr>
+            </a:lvl2pPr>
+            <a:lvl3pPr marL="914400" algn="l" defTabSz="914400" rtl="0" eaLnBrk="1" latinLnBrk="0" hangingPunct="1">
+              <a:defRPr sz="1800" kern="1200">
+                <a:solidFill>
+                  <a:schemeClr val="tx1"/>
+                </a:solidFill>
+                <a:latin typeface="+mn-lt"/>
+                <a:ea typeface="+mn-ea"/>
+                <a:cs typeface="+mn-cs"/>
+              </a:defRPr>
+            </a:lvl3pPr>
+            <a:lvl4pPr marL="1371600" algn="l" defTabSz="914400" rtl="0" eaLnBrk="1" latinLnBrk="0" hangingPunct="1">
+              <a:defRPr sz="1800" kern="1200">
+                <a:solidFill>
+                  <a:schemeClr val="tx1"/>
+                </a:solidFill>
+                <a:latin typeface="+mn-lt"/>
+                <a:ea typeface="+mn-ea"/>
+                <a:cs typeface="+mn-cs"/>
+              </a:defRPr>
+            </a:lvl4pPr>
+            <a:lvl5pPr marL="1828800" algn="l" defTabSz="914400" rtl="0" eaLnBrk="1" latinLnBrk="0" hangingPunct="1">
+              <a:defRPr sz="1800" kern="1200">
+                <a:solidFill>
+                  <a:schemeClr val="tx1"/>
+                </a:solidFill>
+                <a:latin typeface="+mn-lt"/>
+                <a:ea typeface="+mn-ea"/>
+                <a:cs typeface="+mn-cs"/>
+              </a:defRPr>
+            </a:lvl5pPr>
+            <a:lvl6pPr marL="2286000" algn="l" defTabSz="914400" rtl="0" eaLnBrk="1" latinLnBrk="0" hangingPunct="1">
+              <a:defRPr sz="1800" kern="1200">
+                <a:solidFill>
+                  <a:schemeClr val="tx1"/>
+                </a:solidFill>
+                <a:latin typeface="+mn-lt"/>
+                <a:ea typeface="+mn-ea"/>
+                <a:cs typeface="+mn-cs"/>
+              </a:defRPr>
+            </a:lvl6pPr>
+            <a:lvl7pPr marL="2743200" algn="l" defTabSz="914400" rtl="0" eaLnBrk="1" latinLnBrk="0" hangingPunct="1">
+              <a:defRPr sz="1800" kern="1200">
+                <a:solidFill>
+                  <a:schemeClr val="tx1"/>
+                </a:solidFill>
+                <a:latin typeface="+mn-lt"/>
+                <a:ea typeface="+mn-ea"/>
+                <a:cs typeface="+mn-cs"/>
+              </a:defRPr>
+            </a:lvl7pPr>
+            <a:lvl8pPr marL="3200400" algn="l" defTabSz="914400" rtl="0" eaLnBrk="1" latinLnBrk="0" hangingPunct="1">
+              <a:defRPr sz="1800" kern="1200">
+                <a:solidFill>
+                  <a:schemeClr val="tx1"/>
+                </a:solidFill>
+                <a:latin typeface="+mn-lt"/>
+                <a:ea typeface="+mn-ea"/>
+                <a:cs typeface="+mn-cs"/>
+              </a:defRPr>
+            </a:lvl8pPr>
+            <a:lvl9pPr marL="3657600" algn="l" defTabSz="914400" rtl="0" eaLnBrk="1" latinLnBrk="0" hangingPunct="1">
+              <a:defRPr sz="1800" kern="1200">
+                <a:solidFill>
+                  <a:schemeClr val="tx1"/>
+                </a:solidFill>
+                <a:latin typeface="+mn-lt"/>
+                <a:ea typeface="+mn-ea"/>
+                <a:cs typeface="+mn-cs"/>
+              </a:defRPr>
+            </a:lvl9pPr>
+          </a:lstStyle>
+          <a:p>
+            <a:r>
+              <a:rPr lang="en-US" b="1" dirty="0">
+                <a:solidFill>
+                  <a:srgbClr val="FF0000"/>
+                </a:solidFill>
+              </a:rPr>
+              <a:t>1</a:t>
+            </a:r>
+          </a:p>
+        </p:txBody>
+      </p:sp>
+      <p:sp>
+        <p:nvSpPr>
+          <p:cNvPr id="22" name="TextBox 21">
+            <a:extLst>
+              <a:ext uri="{FF2B5EF4-FFF2-40B4-BE49-F238E27FC236}">
+                <a16:creationId xmlns:a16="http://schemas.microsoft.com/office/drawing/2014/main" id="{84C27E1E-6E68-4C67-9D4A-0CC016AD68E2}"/>
+              </a:ext>
+            </a:extLst>
+          </p:cNvPr>
+          <p:cNvSpPr txBox="1"/>
+          <p:nvPr/>
+        </p:nvSpPr>
+        <p:spPr>
+          <a:xfrm>
+            <a:off x="2128463" y="4305692"/>
+            <a:ext cx="300082" cy="369332"/>
+          </a:xfrm>
+          <a:prstGeom prst="rect">
+            <a:avLst/>
+          </a:prstGeom>
+          <a:noFill/>
+        </p:spPr>
+        <p:txBody>
+          <a:bodyPr wrap="none" rtlCol="0">
+            <a:spAutoFit/>
+          </a:bodyPr>
+          <a:lstStyle>
+            <a:defPPr>
+              <a:defRPr lang="en-US"/>
+            </a:defPPr>
+            <a:lvl1pPr marL="0" algn="l" defTabSz="914400" rtl="0" eaLnBrk="1" latinLnBrk="0" hangingPunct="1">
+              <a:defRPr sz="1800" kern="1200">
+                <a:solidFill>
+                  <a:schemeClr val="tx1"/>
+                </a:solidFill>
+                <a:latin typeface="+mn-lt"/>
+                <a:ea typeface="+mn-ea"/>
+                <a:cs typeface="+mn-cs"/>
+              </a:defRPr>
+            </a:lvl1pPr>
+            <a:lvl2pPr marL="457200" algn="l" defTabSz="914400" rtl="0" eaLnBrk="1" latinLnBrk="0" hangingPunct="1">
+              <a:defRPr sz="1800" kern="1200">
+                <a:solidFill>
+                  <a:schemeClr val="tx1"/>
+                </a:solidFill>
+                <a:latin typeface="+mn-lt"/>
+                <a:ea typeface="+mn-ea"/>
+                <a:cs typeface="+mn-cs"/>
+              </a:defRPr>
+            </a:lvl2pPr>
+            <a:lvl3pPr marL="914400" algn="l" defTabSz="914400" rtl="0" eaLnBrk="1" latinLnBrk="0" hangingPunct="1">
+              <a:defRPr sz="1800" kern="1200">
+                <a:solidFill>
+                  <a:schemeClr val="tx1"/>
+                </a:solidFill>
+                <a:latin typeface="+mn-lt"/>
+                <a:ea typeface="+mn-ea"/>
+                <a:cs typeface="+mn-cs"/>
+              </a:defRPr>
+            </a:lvl3pPr>
+            <a:lvl4pPr marL="1371600" algn="l" defTabSz="914400" rtl="0" eaLnBrk="1" latinLnBrk="0" hangingPunct="1">
+              <a:defRPr sz="1800" kern="1200">
+                <a:solidFill>
+                  <a:schemeClr val="tx1"/>
+                </a:solidFill>
+                <a:latin typeface="+mn-lt"/>
+                <a:ea typeface="+mn-ea"/>
+                <a:cs typeface="+mn-cs"/>
+              </a:defRPr>
+            </a:lvl4pPr>
+            <a:lvl5pPr marL="1828800" algn="l" defTabSz="914400" rtl="0" eaLnBrk="1" latinLnBrk="0" hangingPunct="1">
+              <a:defRPr sz="1800" kern="1200">
+                <a:solidFill>
+                  <a:schemeClr val="tx1"/>
+                </a:solidFill>
+                <a:latin typeface="+mn-lt"/>
+                <a:ea typeface="+mn-ea"/>
+                <a:cs typeface="+mn-cs"/>
+              </a:defRPr>
+            </a:lvl5pPr>
+            <a:lvl6pPr marL="2286000" algn="l" defTabSz="914400" rtl="0" eaLnBrk="1" latinLnBrk="0" hangingPunct="1">
+              <a:defRPr sz="1800" kern="1200">
+                <a:solidFill>
+                  <a:schemeClr val="tx1"/>
+                </a:solidFill>
+                <a:latin typeface="+mn-lt"/>
+                <a:ea typeface="+mn-ea"/>
+                <a:cs typeface="+mn-cs"/>
+              </a:defRPr>
+            </a:lvl6pPr>
+            <a:lvl7pPr marL="2743200" algn="l" defTabSz="914400" rtl="0" eaLnBrk="1" latinLnBrk="0" hangingPunct="1">
+              <a:defRPr sz="1800" kern="1200">
+                <a:solidFill>
+                  <a:schemeClr val="tx1"/>
+                </a:solidFill>
+                <a:latin typeface="+mn-lt"/>
+                <a:ea typeface="+mn-ea"/>
+                <a:cs typeface="+mn-cs"/>
+              </a:defRPr>
+            </a:lvl7pPr>
+            <a:lvl8pPr marL="3200400" algn="l" defTabSz="914400" rtl="0" eaLnBrk="1" latinLnBrk="0" hangingPunct="1">
+              <a:defRPr sz="1800" kern="1200">
+                <a:solidFill>
+                  <a:schemeClr val="tx1"/>
+                </a:solidFill>
+                <a:latin typeface="+mn-lt"/>
+                <a:ea typeface="+mn-ea"/>
+                <a:cs typeface="+mn-cs"/>
+              </a:defRPr>
+            </a:lvl8pPr>
+            <a:lvl9pPr marL="3657600" algn="l" defTabSz="914400" rtl="0" eaLnBrk="1" latinLnBrk="0" hangingPunct="1">
+              <a:defRPr sz="1800" kern="1200">
+                <a:solidFill>
+                  <a:schemeClr val="tx1"/>
+                </a:solidFill>
+                <a:latin typeface="+mn-lt"/>
+                <a:ea typeface="+mn-ea"/>
+                <a:cs typeface="+mn-cs"/>
+              </a:defRPr>
+            </a:lvl9pPr>
+          </a:lstStyle>
+          <a:p>
+            <a:r>
+              <a:rPr lang="en-US" b="1" dirty="0">
+                <a:solidFill>
+                  <a:srgbClr val="FF0000"/>
+                </a:solidFill>
+              </a:rPr>
+              <a:t>*</a:t>
+            </a:r>
+          </a:p>
+        </p:txBody>
+      </p:sp>
     </p:spTree>
     <p:extLst>
       <p:ext uri="{BB962C8B-B14F-4D97-AF65-F5344CB8AC3E}">

</xml_diff>